<commit_message>
Dopunjeni slajdovi za IoC
</commit_message>
<xml_diff>
--- a/03-ioc-scope/ioc.pptx
+++ b/03-ioc-scope/ioc.pptx
@@ -9,6 +9,7 @@
     <p:sldId id="259" r:id="rId3"/>
     <p:sldId id="257" r:id="rId4"/>
     <p:sldId id="260" r:id="rId5"/>
+    <p:sldId id="261" r:id="rId6"/>
   </p:sldIdLst>
   <p:sldSz cx="12192000" cy="6858000"/>
   <p:notesSz cx="6858000" cy="9144000"/>
@@ -261,7 +262,7 @@
           <a:lstStyle/>
           <a:p>
             <a:fld id="{C52923FA-0848-7B48-B984-B2F4FFCD020F}" type="datetimeFigureOut">
-              <a:t>11/6/19</a:t>
+              <a:t>28/10/2020</a:t>
             </a:fld>
             <a:endParaRPr lang="en-US"/>
           </a:p>
@@ -457,7 +458,7 @@
           <a:lstStyle/>
           <a:p>
             <a:fld id="{C52923FA-0848-7B48-B984-B2F4FFCD020F}" type="datetimeFigureOut">
-              <a:t>11/6/19</a:t>
+              <a:t>28/10/2020</a:t>
             </a:fld>
             <a:endParaRPr lang="en-US"/>
           </a:p>
@@ -663,7 +664,7 @@
           <a:lstStyle/>
           <a:p>
             <a:fld id="{C52923FA-0848-7B48-B984-B2F4FFCD020F}" type="datetimeFigureOut">
-              <a:t>11/6/19</a:t>
+              <a:t>28/10/2020</a:t>
             </a:fld>
             <a:endParaRPr lang="en-US"/>
           </a:p>
@@ -859,7 +860,7 @@
           <a:lstStyle/>
           <a:p>
             <a:fld id="{C52923FA-0848-7B48-B984-B2F4FFCD020F}" type="datetimeFigureOut">
-              <a:t>11/6/19</a:t>
+              <a:t>28/10/2020</a:t>
             </a:fld>
             <a:endParaRPr lang="en-US"/>
           </a:p>
@@ -1132,7 +1133,7 @@
           <a:lstStyle/>
           <a:p>
             <a:fld id="{C52923FA-0848-7B48-B984-B2F4FFCD020F}" type="datetimeFigureOut">
-              <a:t>11/6/19</a:t>
+              <a:t>28/10/2020</a:t>
             </a:fld>
             <a:endParaRPr lang="en-US"/>
           </a:p>
@@ -1395,7 +1396,7 @@
           <a:lstStyle/>
           <a:p>
             <a:fld id="{C52923FA-0848-7B48-B984-B2F4FFCD020F}" type="datetimeFigureOut">
-              <a:t>11/6/19</a:t>
+              <a:t>28/10/2020</a:t>
             </a:fld>
             <a:endParaRPr lang="en-US"/>
           </a:p>
@@ -1805,7 +1806,7 @@
           <a:lstStyle/>
           <a:p>
             <a:fld id="{C52923FA-0848-7B48-B984-B2F4FFCD020F}" type="datetimeFigureOut">
-              <a:t>11/6/19</a:t>
+              <a:t>28/10/2020</a:t>
             </a:fld>
             <a:endParaRPr lang="en-US"/>
           </a:p>
@@ -1944,7 +1945,7 @@
           <a:lstStyle/>
           <a:p>
             <a:fld id="{C52923FA-0848-7B48-B984-B2F4FFCD020F}" type="datetimeFigureOut">
-              <a:t>11/6/19</a:t>
+              <a:t>28/10/2020</a:t>
             </a:fld>
             <a:endParaRPr lang="en-US"/>
           </a:p>
@@ -2055,7 +2056,7 @@
           <a:lstStyle/>
           <a:p>
             <a:fld id="{C52923FA-0848-7B48-B984-B2F4FFCD020F}" type="datetimeFigureOut">
-              <a:t>11/6/19</a:t>
+              <a:t>28/10/2020</a:t>
             </a:fld>
             <a:endParaRPr lang="en-US"/>
           </a:p>
@@ -2364,7 +2365,7 @@
           <a:lstStyle/>
           <a:p>
             <a:fld id="{C52923FA-0848-7B48-B984-B2F4FFCD020F}" type="datetimeFigureOut">
-              <a:t>11/6/19</a:t>
+              <a:t>28/10/2020</a:t>
             </a:fld>
             <a:endParaRPr lang="en-US"/>
           </a:p>
@@ -2650,7 +2651,7 @@
           <a:lstStyle/>
           <a:p>
             <a:fld id="{C52923FA-0848-7B48-B984-B2F4FFCD020F}" type="datetimeFigureOut">
-              <a:t>11/6/19</a:t>
+              <a:t>28/10/2020</a:t>
             </a:fld>
             <a:endParaRPr lang="en-US"/>
           </a:p>
@@ -2889,7 +2890,7 @@
           </a:lstStyle>
           <a:p>
             <a:fld id="{C52923FA-0848-7B48-B984-B2F4FFCD020F}" type="datetimeFigureOut">
-              <a:t>11/6/19</a:t>
+              <a:t>28/10/2020</a:t>
             </a:fld>
             <a:endParaRPr lang="en-US"/>
           </a:p>
@@ -4508,6 +4509,119 @@
 </p:sld>
 </file>
 
+<file path=ppt/slides/slide5.xml><?xml version="1.0" encoding="utf-8"?>
+<p:sld xmlns:a="http://schemas.openxmlformats.org/drawingml/2006/main" xmlns:r="http://schemas.openxmlformats.org/officeDocument/2006/relationships" xmlns:p="http://schemas.openxmlformats.org/presentationml/2006/main">
+  <p:cSld>
+    <p:spTree>
+      <p:nvGrpSpPr>
+        <p:cNvPr id="1" name=""/>
+        <p:cNvGrpSpPr/>
+        <p:nvPr/>
+      </p:nvGrpSpPr>
+      <p:grpSpPr>
+        <a:xfrm>
+          <a:off x="0" y="0"/>
+          <a:ext cx="0" cy="0"/>
+          <a:chOff x="0" y="0"/>
+          <a:chExt cx="0" cy="0"/>
+        </a:xfrm>
+      </p:grpSpPr>
+      <p:sp>
+        <p:nvSpPr>
+          <p:cNvPr id="2" name="TextBox 1">
+            <a:extLst>
+              <a:ext uri="{FF2B5EF4-FFF2-40B4-BE49-F238E27FC236}">
+                <a16:creationId xmlns:a16="http://schemas.microsoft.com/office/drawing/2014/main" id="{DDF35FD2-3CD6-6348-8AAC-B0D52E814A96}"/>
+              </a:ext>
+            </a:extLst>
+          </p:cNvPr>
+          <p:cNvSpPr txBox="1"/>
+          <p:nvPr/>
+        </p:nvSpPr>
+        <p:spPr>
+          <a:xfrm>
+            <a:off x="0" y="0"/>
+            <a:ext cx="11545405" cy="584775"/>
+          </a:xfrm>
+          <a:prstGeom prst="rect">
+            <a:avLst/>
+          </a:prstGeom>
+          <a:noFill/>
+        </p:spPr>
+        <p:txBody>
+          <a:bodyPr wrap="none" rtlCol="0">
+            <a:spAutoFit/>
+          </a:bodyPr>
+          <a:lstStyle/>
+          <a:p>
+            <a:r>
+              <a:rPr lang="en-US" sz="3200" b="1"/>
+              <a:t>Životni ciklus komponenti unutar kontejnera – primer Spring beans</a:t>
+            </a:r>
+            <a:endParaRPr lang="en-US" sz="3200"/>
+          </a:p>
+        </p:txBody>
+      </p:sp>
+      <p:pic>
+        <p:nvPicPr>
+          <p:cNvPr id="1026" name="Picture 2">
+            <a:extLst>
+              <a:ext uri="{FF2B5EF4-FFF2-40B4-BE49-F238E27FC236}">
+                <a16:creationId xmlns:a16="http://schemas.microsoft.com/office/drawing/2014/main" id="{9AF6DF86-1CC1-6644-A6BC-00870A07C2AD}"/>
+              </a:ext>
+            </a:extLst>
+          </p:cNvPr>
+          <p:cNvPicPr>
+            <a:picLocks noChangeAspect="1" noChangeArrowheads="1"/>
+          </p:cNvPicPr>
+          <p:nvPr/>
+        </p:nvPicPr>
+        <p:blipFill>
+          <a:blip r:embed="rId2">
+            <a:extLst>
+              <a:ext uri="{28A0092B-C50C-407E-A947-70E740481C1C}">
+                <a14:useLocalDpi xmlns:a14="http://schemas.microsoft.com/office/drawing/2010/main" val="0"/>
+              </a:ext>
+            </a:extLst>
+          </a:blip>
+          <a:srcRect/>
+          <a:stretch>
+            <a:fillRect/>
+          </a:stretch>
+        </p:blipFill>
+        <p:spPr bwMode="auto">
+          <a:xfrm>
+            <a:off x="653260" y="1239683"/>
+            <a:ext cx="10885479" cy="4958775"/>
+          </a:xfrm>
+          <a:prstGeom prst="rect">
+            <a:avLst/>
+          </a:prstGeom>
+          <a:noFill/>
+          <a:extLst>
+            <a:ext uri="{909E8E84-426E-40DD-AFC4-6F175D3DCCD1}">
+              <a14:hiddenFill xmlns:a14="http://schemas.microsoft.com/office/drawing/2010/main">
+                <a:solidFill>
+                  <a:srgbClr val="FFFFFF"/>
+                </a:solidFill>
+              </a14:hiddenFill>
+            </a:ext>
+          </a:extLst>
+        </p:spPr>
+      </p:pic>
+    </p:spTree>
+    <p:extLst>
+      <p:ext uri="{BB962C8B-B14F-4D97-AF65-F5344CB8AC3E}">
+        <p14:creationId xmlns:p14="http://schemas.microsoft.com/office/powerpoint/2010/main" val="1333070123"/>
+      </p:ext>
+    </p:extLst>
+  </p:cSld>
+  <p:clrMapOvr>
+    <a:masterClrMapping/>
+  </p:clrMapOvr>
+</p:sld>
+</file>
+
 <file path=ppt/theme/theme1.xml><?xml version="1.0" encoding="utf-8"?>
 <a:theme xmlns:a="http://schemas.openxmlformats.org/drawingml/2006/main" name="Office Theme">
   <a:themeElements>

</xml_diff>